<commit_message>
alteração final desenho de solução
</commit_message>
<xml_diff>
--- a/documentacao/Desenho de solução/Solução do Projeto com Containers.pptx
+++ b/documentacao/Desenho de solução/Solução do Projeto com Containers.pptx
@@ -253,7 +253,7 @@
           <a:p>
             <a:fld id="{C0C7093E-3454-4D60-86CF-1DF1D2C66BEB}" type="datetimeFigureOut">
               <a:rPr lang="pt-BR" smtClean="0"/>
-              <a:t>10/10/2021</a:t>
+              <a:t>19/10/2021</a:t>
             </a:fld>
             <a:endParaRPr lang="pt-BR"/>
           </a:p>
@@ -423,7 +423,7 @@
           <a:p>
             <a:fld id="{C0C7093E-3454-4D60-86CF-1DF1D2C66BEB}" type="datetimeFigureOut">
               <a:rPr lang="pt-BR" smtClean="0"/>
-              <a:t>10/10/2021</a:t>
+              <a:t>19/10/2021</a:t>
             </a:fld>
             <a:endParaRPr lang="pt-BR"/>
           </a:p>
@@ -603,7 +603,7 @@
           <a:p>
             <a:fld id="{C0C7093E-3454-4D60-86CF-1DF1D2C66BEB}" type="datetimeFigureOut">
               <a:rPr lang="pt-BR" smtClean="0"/>
-              <a:t>10/10/2021</a:t>
+              <a:t>19/10/2021</a:t>
             </a:fld>
             <a:endParaRPr lang="pt-BR"/>
           </a:p>
@@ -773,7 +773,7 @@
           <a:p>
             <a:fld id="{C0C7093E-3454-4D60-86CF-1DF1D2C66BEB}" type="datetimeFigureOut">
               <a:rPr lang="pt-BR" smtClean="0"/>
-              <a:t>10/10/2021</a:t>
+              <a:t>19/10/2021</a:t>
             </a:fld>
             <a:endParaRPr lang="pt-BR"/>
           </a:p>
@@ -1019,7 +1019,7 @@
           <a:p>
             <a:fld id="{C0C7093E-3454-4D60-86CF-1DF1D2C66BEB}" type="datetimeFigureOut">
               <a:rPr lang="pt-BR" smtClean="0"/>
-              <a:t>10/10/2021</a:t>
+              <a:t>19/10/2021</a:t>
             </a:fld>
             <a:endParaRPr lang="pt-BR"/>
           </a:p>
@@ -1251,7 +1251,7 @@
           <a:p>
             <a:fld id="{C0C7093E-3454-4D60-86CF-1DF1D2C66BEB}" type="datetimeFigureOut">
               <a:rPr lang="pt-BR" smtClean="0"/>
-              <a:t>10/10/2021</a:t>
+              <a:t>19/10/2021</a:t>
             </a:fld>
             <a:endParaRPr lang="pt-BR"/>
           </a:p>
@@ -1618,7 +1618,7 @@
           <a:p>
             <a:fld id="{C0C7093E-3454-4D60-86CF-1DF1D2C66BEB}" type="datetimeFigureOut">
               <a:rPr lang="pt-BR" smtClean="0"/>
-              <a:t>10/10/2021</a:t>
+              <a:t>19/10/2021</a:t>
             </a:fld>
             <a:endParaRPr lang="pt-BR"/>
           </a:p>
@@ -1736,7 +1736,7 @@
           <a:p>
             <a:fld id="{C0C7093E-3454-4D60-86CF-1DF1D2C66BEB}" type="datetimeFigureOut">
               <a:rPr lang="pt-BR" smtClean="0"/>
-              <a:t>10/10/2021</a:t>
+              <a:t>19/10/2021</a:t>
             </a:fld>
             <a:endParaRPr lang="pt-BR"/>
           </a:p>
@@ -1831,7 +1831,7 @@
           <a:p>
             <a:fld id="{C0C7093E-3454-4D60-86CF-1DF1D2C66BEB}" type="datetimeFigureOut">
               <a:rPr lang="pt-BR" smtClean="0"/>
-              <a:t>10/10/2021</a:t>
+              <a:t>19/10/2021</a:t>
             </a:fld>
             <a:endParaRPr lang="pt-BR"/>
           </a:p>
@@ -2108,7 +2108,7 @@
           <a:p>
             <a:fld id="{C0C7093E-3454-4D60-86CF-1DF1D2C66BEB}" type="datetimeFigureOut">
               <a:rPr lang="pt-BR" smtClean="0"/>
-              <a:t>10/10/2021</a:t>
+              <a:t>19/10/2021</a:t>
             </a:fld>
             <a:endParaRPr lang="pt-BR"/>
           </a:p>
@@ -2365,7 +2365,7 @@
           <a:p>
             <a:fld id="{C0C7093E-3454-4D60-86CF-1DF1D2C66BEB}" type="datetimeFigureOut">
               <a:rPr lang="pt-BR" smtClean="0"/>
-              <a:t>10/10/2021</a:t>
+              <a:t>19/10/2021</a:t>
             </a:fld>
             <a:endParaRPr lang="pt-BR"/>
           </a:p>
@@ -2578,7 +2578,7 @@
           <a:p>
             <a:fld id="{C0C7093E-3454-4D60-86CF-1DF1D2C66BEB}" type="datetimeFigureOut">
               <a:rPr lang="pt-BR" smtClean="0"/>
-              <a:t>10/10/2021</a:t>
+              <a:t>19/10/2021</a:t>
             </a:fld>
             <a:endParaRPr lang="pt-BR"/>
           </a:p>
@@ -2969,6 +2969,14 @@
 <file path=ppt/slides/slide1.xml><?xml version="1.0" encoding="utf-8"?>
 <p:sld xmlns:a="http://schemas.openxmlformats.org/drawingml/2006/main" xmlns:r="http://schemas.openxmlformats.org/officeDocument/2006/relationships" xmlns:p="http://schemas.openxmlformats.org/presentationml/2006/main">
   <p:cSld>
+    <p:bg>
+      <p:bgPr>
+        <a:solidFill>
+          <a:srgbClr val="1B2024"/>
+        </a:solidFill>
+        <a:effectLst/>
+      </p:bgPr>
+    </p:bg>
     <p:spTree>
       <p:nvGrpSpPr>
         <p:cNvPr id="1" name=""/>
@@ -3138,7 +3146,7 @@
           <p:spPr>
             <a:xfrm>
               <a:off x="426094" y="2674578"/>
-              <a:ext cx="2004558" cy="494460"/>
+              <a:ext cx="2004558" cy="667521"/>
             </a:xfrm>
             <a:prstGeom prst="rect">
               <a:avLst/>
@@ -3161,15 +3169,18 @@
                     </a:schemeClr>
                   </a:solidFill>
                 </a:rPr>
-                <a:t>APIs para a geolocalização das quadras esportivas</a:t>
+                <a:t>APIs para a geolocalização das quadras esportivas </a:t>
               </a:r>
-              <a:endParaRPr lang="pt-BR" sz="1050" dirty="0">
-                <a:solidFill>
-                  <a:schemeClr val="bg1">
-                    <a:lumMod val="10000"/>
-                  </a:schemeClr>
-                </a:solidFill>
-              </a:endParaRPr>
+              <a:r>
+                <a:rPr lang="pt-BR" sz="1050" dirty="0">
+                  <a:solidFill>
+                    <a:schemeClr val="bg1">
+                      <a:lumMod val="10000"/>
+                    </a:schemeClr>
+                  </a:solidFill>
+                </a:rPr>
+                <a:t>para se fazer no futuro. </a:t>
+              </a:r>
             </a:p>
           </p:txBody>
         </p:sp>
@@ -3672,7 +3683,7 @@
           <p:spPr>
             <a:xfrm>
               <a:off x="10190247" y="5561989"/>
-              <a:ext cx="1965617" cy="657047"/>
+              <a:ext cx="1965617" cy="844775"/>
             </a:xfrm>
             <a:prstGeom prst="rect">
               <a:avLst/>
@@ -3693,7 +3704,7 @@
                     <a:prstClr val="white"/>
                   </a:solidFill>
                 </a:rPr>
-                <a:t>Aplicativo para a localização e agendamento de quadras esportivas  </a:t>
+                <a:t>Aplicativo para a localização e agendamento de quadras esportivas para se fazer no futuro. </a:t>
               </a:r>
               <a:endParaRPr lang="pt-BR" sz="1050" dirty="0">
                 <a:solidFill>
@@ -4443,13 +4454,15 @@
           </p:cNvPr>
           <p:cNvCxnSpPr>
             <a:cxnSpLocks/>
+            <a:stCxn id="71" idx="2"/>
+            <a:endCxn id="49" idx="1"/>
           </p:cNvCxnSpPr>
           <p:nvPr/>
         </p:nvCxnSpPr>
         <p:spPr>
-          <a:xfrm rot="5400000" flipH="1" flipV="1">
-            <a:off x="8715723" y="1970021"/>
-            <a:ext cx="1557657" cy="2723267"/>
+          <a:xfrm rot="5400000">
+            <a:off x="8761100" y="2452560"/>
+            <a:ext cx="1627403" cy="1852222"/>
           </a:xfrm>
           <a:prstGeom prst="bentConnector3">
             <a:avLst>
@@ -4671,7 +4684,7 @@
           <p:spPr>
             <a:xfrm>
               <a:off x="8923485" y="2336548"/>
-              <a:ext cx="2216042" cy="685922"/>
+              <a:ext cx="2216042" cy="881899"/>
             </a:xfrm>
             <a:prstGeom prst="rect">
               <a:avLst/>
@@ -4688,8 +4701,17 @@
               </a:pPr>
               <a:r>
                 <a:rPr lang="pt-BR" sz="1200" dirty="0"/>
-                <a:t>Aplicação para manipulação de dados de agendamentos dos jogadores</a:t>
+                <a:t>Aplicação para manipulação de dados de agendamentos dos jogadores </a:t>
               </a:r>
+              <a:r>
+                <a:rPr lang="pt-BR" sz="1200" dirty="0">
+                  <a:solidFill>
+                    <a:prstClr val="white"/>
+                  </a:solidFill>
+                </a:rPr>
+                <a:t>para se fazer no futuro. </a:t>
+              </a:r>
+              <a:endParaRPr lang="pt-BR" sz="1200" dirty="0"/>
             </a:p>
           </p:txBody>
         </p:sp>
@@ -5181,13 +5203,12 @@
           </p:cNvPr>
           <p:cNvCxnSpPr>
             <a:cxnSpLocks/>
-            <a:endCxn id="39" idx="2"/>
           </p:cNvCxnSpPr>
           <p:nvPr/>
         </p:nvCxnSpPr>
         <p:spPr>
           <a:xfrm flipH="1" flipV="1">
-            <a:off x="7811394" y="2418699"/>
+            <a:off x="7777644" y="2436369"/>
             <a:ext cx="1976" cy="1679640"/>
           </a:xfrm>
           <a:prstGeom prst="straightConnector1">

</xml_diff>